<commit_message>
drafted L2 distributions, basic stats, confidence interval
</commit_message>
<xml_diff>
--- a/dsmcer_2023_update/Lecture_Notebooks/L1_visual_support.pptx
+++ b/dsmcer_2023_update/Lecture_Notebooks/L1_visual_support.pptx
@@ -7,6 +7,11 @@
   <p:sldIdLst>
     <p:sldId id="256" r:id="rId2"/>
     <p:sldId id="257" r:id="rId3"/>
+    <p:sldId id="259" r:id="rId4"/>
+    <p:sldId id="260" r:id="rId5"/>
+    <p:sldId id="261" r:id="rId6"/>
+    <p:sldId id="262" r:id="rId7"/>
+    <p:sldId id="263" r:id="rId8"/>
   </p:sldIdLst>
   <p:sldSz cx="12192000" cy="6858000"/>
   <p:notesSz cx="6858000" cy="9144000"/>
@@ -3384,35 +3389,10 @@
       </p:grpSpPr>
       <p:sp>
         <p:nvSpPr>
-          <p:cNvPr id="2" name="Title 1">
-            <a:extLst>
-              <a:ext uri="{FF2B5EF4-FFF2-40B4-BE49-F238E27FC236}">
-                <a16:creationId xmlns:a16="http://schemas.microsoft.com/office/drawing/2014/main" id="{821793D6-CE73-6987-DEB4-A299A519AC4C}"/>
-              </a:ext>
-            </a:extLst>
-          </p:cNvPr>
-          <p:cNvSpPr>
-            <a:spLocks noGrp="1"/>
-          </p:cNvSpPr>
-          <p:nvPr>
-            <p:ph type="title"/>
-          </p:nvPr>
-        </p:nvSpPr>
-        <p:spPr/>
-        <p:txBody>
-          <a:bodyPr/>
-          <a:lstStyle/>
-          <a:p>
-            <a:endParaRPr lang="en-US"/>
-          </a:p>
-        </p:txBody>
-      </p:sp>
-      <p:sp>
-        <p:nvSpPr>
-          <p:cNvPr id="3" name="Content Placeholder 2">
-            <a:extLst>
-              <a:ext uri="{FF2B5EF4-FFF2-40B4-BE49-F238E27FC236}">
-                <a16:creationId xmlns:a16="http://schemas.microsoft.com/office/drawing/2014/main" id="{1576F691-F003-78DD-88F7-A937EDE7B9F0}"/>
+          <p:cNvPr id="6" name="Content Placeholder 2">
+            <a:extLst>
+              <a:ext uri="{FF2B5EF4-FFF2-40B4-BE49-F238E27FC236}">
+                <a16:creationId xmlns:a16="http://schemas.microsoft.com/office/drawing/2014/main" id="{B20305C4-BB09-1206-91AD-7ED0DCB2D991}"/>
               </a:ext>
             </a:extLst>
           </p:cNvPr>
@@ -3423,12 +3403,316 @@
             <p:ph idx="1"/>
           </p:nvPr>
         </p:nvSpPr>
-        <p:spPr/>
-        <p:txBody>
-          <a:bodyPr/>
-          <a:lstStyle/>
-          <a:p>
-            <a:endParaRPr lang="en-US"/>
+        <p:spPr>
+          <a:xfrm>
+            <a:off x="1900699" y="1914882"/>
+            <a:ext cx="8229600" cy="4853972"/>
+          </a:xfrm>
+        </p:spPr>
+        <p:txBody>
+          <a:bodyPr/>
+          <a:lstStyle/>
+          <a:p>
+            <a:pPr marL="0" indent="0">
+              <a:buNone/>
+            </a:pPr>
+            <a:r>
+              <a:rPr lang="en-US" dirty="0"/>
+              <a:t>Types of </a:t>
+            </a:r>
+            <a:r>
+              <a:rPr lang="en-US" b="1" dirty="0"/>
+              <a:t>Data</a:t>
+            </a:r>
+            <a:r>
+              <a:rPr lang="en-US" dirty="0"/>
+              <a:t>:</a:t>
+            </a:r>
+          </a:p>
+          <a:p>
+            <a:r>
+              <a:rPr lang="en-US" dirty="0"/>
+              <a:t>Nominal (labels or categories)</a:t>
+            </a:r>
+          </a:p>
+          <a:p>
+            <a:r>
+              <a:rPr lang="en-US" dirty="0"/>
+              <a:t>Ordinal (ordered labels)</a:t>
+            </a:r>
+          </a:p>
+          <a:p>
+            <a:r>
+              <a:rPr lang="en-US" dirty="0"/>
+              <a:t>Quantitative (continuous)</a:t>
+            </a:r>
+          </a:p>
+          <a:p>
+            <a:endParaRPr lang="en-US" dirty="0"/>
+          </a:p>
+          <a:p>
+            <a:pPr marL="342900" indent="-342900">
+              <a:buFont typeface="Arial" panose="020B0604020202020204" pitchFamily="34" charset="0"/>
+              <a:buChar char="•"/>
+            </a:pPr>
+            <a:endParaRPr lang="en-US" dirty="0"/>
+          </a:p>
+        </p:txBody>
+      </p:sp>
+      <p:pic>
+        <p:nvPicPr>
+          <p:cNvPr id="8" name="Graphic 7" descr="Apple with solid fill">
+            <a:extLst>
+              <a:ext uri="{FF2B5EF4-FFF2-40B4-BE49-F238E27FC236}">
+                <a16:creationId xmlns:a16="http://schemas.microsoft.com/office/drawing/2014/main" id="{2A3E2F30-BF5B-0193-E7FB-C4C5D822C053}"/>
+              </a:ext>
+            </a:extLst>
+          </p:cNvPr>
+          <p:cNvPicPr>
+            <a:picLocks noChangeAspect="1"/>
+          </p:cNvPicPr>
+          <p:nvPr/>
+        </p:nvPicPr>
+        <p:blipFill>
+          <a:blip r:embed="rId2">
+            <a:extLst>
+              <a:ext uri="{96DAC541-7B7A-43D3-8B79-37D633B846F1}">
+                <asvg:svgBlip xmlns:asvg="http://schemas.microsoft.com/office/drawing/2016/SVG/main" r:embed="rId3"/>
+              </a:ext>
+            </a:extLst>
+          </a:blip>
+          <a:stretch>
+            <a:fillRect/>
+          </a:stretch>
+        </p:blipFill>
+        <p:spPr>
+          <a:xfrm>
+            <a:off x="6734827" y="2298524"/>
+            <a:ext cx="635697" cy="635697"/>
+          </a:xfrm>
+          <a:prstGeom prst="rect">
+            <a:avLst/>
+          </a:prstGeom>
+        </p:spPr>
+      </p:pic>
+      <p:pic>
+        <p:nvPicPr>
+          <p:cNvPr id="10" name="Graphic 9" descr="Orange with solid fill">
+            <a:extLst>
+              <a:ext uri="{FF2B5EF4-FFF2-40B4-BE49-F238E27FC236}">
+                <a16:creationId xmlns:a16="http://schemas.microsoft.com/office/drawing/2014/main" id="{6F5D59BA-6709-BCDE-5C5A-653069A8EBFB}"/>
+              </a:ext>
+            </a:extLst>
+          </p:cNvPr>
+          <p:cNvPicPr>
+            <a:picLocks noChangeAspect="1"/>
+          </p:cNvPicPr>
+          <p:nvPr/>
+        </p:nvPicPr>
+        <p:blipFill>
+          <a:blip r:embed="rId4">
+            <a:extLst>
+              <a:ext uri="{96DAC541-7B7A-43D3-8B79-37D633B846F1}">
+                <asvg:svgBlip xmlns:asvg="http://schemas.microsoft.com/office/drawing/2016/SVG/main" r:embed="rId5"/>
+              </a:ext>
+            </a:extLst>
+          </a:blip>
+          <a:stretch>
+            <a:fillRect/>
+          </a:stretch>
+        </p:blipFill>
+        <p:spPr>
+          <a:xfrm>
+            <a:off x="7989518" y="2298524"/>
+            <a:ext cx="635697" cy="635697"/>
+          </a:xfrm>
+          <a:prstGeom prst="rect">
+            <a:avLst/>
+          </a:prstGeom>
+        </p:spPr>
+      </p:pic>
+      <p:pic>
+        <p:nvPicPr>
+          <p:cNvPr id="12" name="Graphic 11" descr="Banana with solid fill">
+            <a:extLst>
+              <a:ext uri="{FF2B5EF4-FFF2-40B4-BE49-F238E27FC236}">
+                <a16:creationId xmlns:a16="http://schemas.microsoft.com/office/drawing/2014/main" id="{D277583E-EF5E-9996-A2D8-C87A4A7DD701}"/>
+              </a:ext>
+            </a:extLst>
+          </p:cNvPr>
+          <p:cNvPicPr>
+            <a:picLocks noChangeAspect="1"/>
+          </p:cNvPicPr>
+          <p:nvPr/>
+        </p:nvPicPr>
+        <p:blipFill>
+          <a:blip r:embed="rId6">
+            <a:extLst>
+              <a:ext uri="{96DAC541-7B7A-43D3-8B79-37D633B846F1}">
+                <asvg:svgBlip xmlns:asvg="http://schemas.microsoft.com/office/drawing/2016/SVG/main" r:embed="rId7"/>
+              </a:ext>
+            </a:extLst>
+          </a:blip>
+          <a:stretch>
+            <a:fillRect/>
+          </a:stretch>
+        </p:blipFill>
+        <p:spPr>
+          <a:xfrm>
+            <a:off x="9108509" y="2298524"/>
+            <a:ext cx="635697" cy="635697"/>
+          </a:xfrm>
+          <a:prstGeom prst="rect">
+            <a:avLst/>
+          </a:prstGeom>
+        </p:spPr>
+      </p:pic>
+      <p:cxnSp>
+        <p:nvCxnSpPr>
+          <p:cNvPr id="14" name="Straight Arrow Connector 13">
+            <a:extLst>
+              <a:ext uri="{FF2B5EF4-FFF2-40B4-BE49-F238E27FC236}">
+                <a16:creationId xmlns:a16="http://schemas.microsoft.com/office/drawing/2014/main" id="{4FDC92B4-9D30-53A7-11C7-E7708A17AC84}"/>
+              </a:ext>
+            </a:extLst>
+          </p:cNvPr>
+          <p:cNvCxnSpPr/>
+          <p:nvPr/>
+        </p:nvCxnSpPr>
+        <p:spPr>
+          <a:xfrm>
+            <a:off x="6902363" y="3773466"/>
+            <a:ext cx="2691531" cy="0"/>
+          </a:xfrm>
+          <a:prstGeom prst="straightConnector1">
+            <a:avLst/>
+          </a:prstGeom>
+          <a:ln w="31750">
+            <a:headEnd type="triangle" w="lg" len="med"/>
+            <a:tailEnd type="triangle" w="lg" len="med"/>
+          </a:ln>
+        </p:spPr>
+        <p:style>
+          <a:lnRef idx="1">
+            <a:schemeClr val="accent1"/>
+          </a:lnRef>
+          <a:fillRef idx="0">
+            <a:schemeClr val="accent1"/>
+          </a:fillRef>
+          <a:effectRef idx="0">
+            <a:schemeClr val="accent1"/>
+          </a:effectRef>
+          <a:fontRef idx="minor">
+            <a:schemeClr val="tx1"/>
+          </a:fontRef>
+        </p:style>
+      </p:cxnSp>
+      <p:sp>
+        <p:nvSpPr>
+          <p:cNvPr id="15" name="TextBox 14">
+            <a:extLst>
+              <a:ext uri="{FF2B5EF4-FFF2-40B4-BE49-F238E27FC236}">
+                <a16:creationId xmlns:a16="http://schemas.microsoft.com/office/drawing/2014/main" id="{C5A873A1-C00B-04D7-6E11-25F6278A36B6}"/>
+              </a:ext>
+            </a:extLst>
+          </p:cNvPr>
+          <p:cNvSpPr txBox="1"/>
+          <p:nvPr/>
+        </p:nvSpPr>
+        <p:spPr>
+          <a:xfrm>
+            <a:off x="8156523" y="3773466"/>
+            <a:ext cx="301686" cy="369332"/>
+          </a:xfrm>
+          <a:prstGeom prst="rect">
+            <a:avLst/>
+          </a:prstGeom>
+          <a:noFill/>
+        </p:spPr>
+        <p:txBody>
+          <a:bodyPr wrap="none" rtlCol="0">
+            <a:spAutoFit/>
+          </a:bodyPr>
+          <a:lstStyle/>
+          <a:p>
+            <a:r>
+              <a:rPr lang="en-US" dirty="0"/>
+              <a:t>0</a:t>
+            </a:r>
+          </a:p>
+        </p:txBody>
+      </p:sp>
+      <p:cxnSp>
+        <p:nvCxnSpPr>
+          <p:cNvPr id="17" name="Straight Connector 16">
+            <a:extLst>
+              <a:ext uri="{FF2B5EF4-FFF2-40B4-BE49-F238E27FC236}">
+                <a16:creationId xmlns:a16="http://schemas.microsoft.com/office/drawing/2014/main" id="{470C592B-F7DA-0E3B-8120-6DAFEEDC6EE1}"/>
+              </a:ext>
+            </a:extLst>
+          </p:cNvPr>
+          <p:cNvCxnSpPr>
+            <a:cxnSpLocks/>
+          </p:cNvCxnSpPr>
+          <p:nvPr/>
+        </p:nvCxnSpPr>
+        <p:spPr>
+          <a:xfrm flipV="1">
+            <a:off x="8307366" y="3723362"/>
+            <a:ext cx="0" cy="100208"/>
+          </a:xfrm>
+          <a:prstGeom prst="line">
+            <a:avLst/>
+          </a:prstGeom>
+          <a:ln w="12700"/>
+        </p:spPr>
+        <p:style>
+          <a:lnRef idx="1">
+            <a:schemeClr val="accent1"/>
+          </a:lnRef>
+          <a:fillRef idx="0">
+            <a:schemeClr val="accent1"/>
+          </a:fillRef>
+          <a:effectRef idx="0">
+            <a:schemeClr val="accent1"/>
+          </a:effectRef>
+          <a:fontRef idx="minor">
+            <a:schemeClr val="tx1"/>
+          </a:fontRef>
+        </p:style>
+      </p:cxnSp>
+      <p:sp>
+        <p:nvSpPr>
+          <p:cNvPr id="18" name="TextBox 17">
+            <a:extLst>
+              <a:ext uri="{FF2B5EF4-FFF2-40B4-BE49-F238E27FC236}">
+                <a16:creationId xmlns:a16="http://schemas.microsoft.com/office/drawing/2014/main" id="{E39001C0-24E8-4B63-65A6-9B30AF8CD4C8}"/>
+              </a:ext>
+            </a:extLst>
+          </p:cNvPr>
+          <p:cNvSpPr txBox="1"/>
+          <p:nvPr/>
+        </p:nvSpPr>
+        <p:spPr>
+          <a:xfrm>
+            <a:off x="6680455" y="3004024"/>
+            <a:ext cx="3135345" cy="400110"/>
+          </a:xfrm>
+          <a:prstGeom prst="rect">
+            <a:avLst/>
+          </a:prstGeom>
+          <a:noFill/>
+        </p:spPr>
+        <p:txBody>
+          <a:bodyPr wrap="none" rtlCol="0">
+            <a:spAutoFit/>
+          </a:bodyPr>
+          <a:lstStyle/>
+          <a:p>
+            <a:r>
+              <a:rPr lang="en-US" sz="2000" dirty="0"/>
+              <a:t>F, D, C-, C, C+, B-, B, B+, A-, A</a:t>
+            </a:r>
           </a:p>
         </p:txBody>
       </p:sp>
@@ -3436,6 +3720,699 @@
     <p:extLst>
       <p:ext uri="{BB962C8B-B14F-4D97-AF65-F5344CB8AC3E}">
         <p14:creationId xmlns:p14="http://schemas.microsoft.com/office/powerpoint/2010/main" val="3224100457"/>
+      </p:ext>
+    </p:extLst>
+  </p:cSld>
+  <p:clrMapOvr>
+    <a:masterClrMapping/>
+  </p:clrMapOvr>
+</p:sld>
+</file>
+
+<file path=ppt/slides/slide3.xml><?xml version="1.0" encoding="utf-8"?>
+<p:sld xmlns:a="http://schemas.openxmlformats.org/drawingml/2006/main" xmlns:r="http://schemas.openxmlformats.org/officeDocument/2006/relationships" xmlns:p="http://schemas.openxmlformats.org/presentationml/2006/main">
+  <p:cSld>
+    <p:spTree>
+      <p:nvGrpSpPr>
+        <p:cNvPr id="1" name=""/>
+        <p:cNvGrpSpPr/>
+        <p:nvPr/>
+      </p:nvGrpSpPr>
+      <p:grpSpPr>
+        <a:xfrm>
+          <a:off x="0" y="0"/>
+          <a:ext cx="0" cy="0"/>
+          <a:chOff x="0" y="0"/>
+          <a:chExt cx="0" cy="0"/>
+        </a:xfrm>
+      </p:grpSpPr>
+      <p:sp>
+        <p:nvSpPr>
+          <p:cNvPr id="6" name="Content Placeholder 2">
+            <a:extLst>
+              <a:ext uri="{FF2B5EF4-FFF2-40B4-BE49-F238E27FC236}">
+                <a16:creationId xmlns:a16="http://schemas.microsoft.com/office/drawing/2014/main" id="{B20305C4-BB09-1206-91AD-7ED0DCB2D991}"/>
+              </a:ext>
+            </a:extLst>
+          </p:cNvPr>
+          <p:cNvSpPr>
+            <a:spLocks noGrp="1"/>
+          </p:cNvSpPr>
+          <p:nvPr>
+            <p:ph idx="1"/>
+          </p:nvPr>
+        </p:nvSpPr>
+        <p:spPr>
+          <a:xfrm>
+            <a:off x="1900699" y="1914882"/>
+            <a:ext cx="8229600" cy="4853972"/>
+          </a:xfrm>
+        </p:spPr>
+        <p:txBody>
+          <a:bodyPr/>
+          <a:lstStyle/>
+          <a:p>
+            <a:pPr marL="0" indent="0">
+              <a:buNone/>
+            </a:pPr>
+            <a:r>
+              <a:rPr lang="en-US" dirty="0"/>
+              <a:t>Types of </a:t>
+            </a:r>
+            <a:r>
+              <a:rPr lang="en-US" b="1" dirty="0"/>
+              <a:t>Encoding:</a:t>
+            </a:r>
+            <a:endParaRPr lang="en-US" dirty="0"/>
+          </a:p>
+          <a:p>
+            <a:endParaRPr lang="en-US" dirty="0"/>
+          </a:p>
+          <a:p>
+            <a:pPr marL="342900" indent="-342900">
+              <a:buFont typeface="Arial" panose="020B0604020202020204" pitchFamily="34" charset="0"/>
+              <a:buChar char="•"/>
+            </a:pPr>
+            <a:endParaRPr lang="en-US" dirty="0"/>
+          </a:p>
+        </p:txBody>
+      </p:sp>
+      <p:pic>
+        <p:nvPicPr>
+          <p:cNvPr id="2" name="Picture 2">
+            <a:extLst>
+              <a:ext uri="{FF2B5EF4-FFF2-40B4-BE49-F238E27FC236}">
+                <a16:creationId xmlns:a16="http://schemas.microsoft.com/office/drawing/2014/main" id="{317D2C99-E04B-7A1B-F76C-1A0282F57BB8}"/>
+              </a:ext>
+            </a:extLst>
+          </p:cNvPr>
+          <p:cNvPicPr>
+            <a:picLocks noChangeAspect="1" noChangeArrowheads="1"/>
+          </p:cNvPicPr>
+          <p:nvPr/>
+        </p:nvPicPr>
+        <p:blipFill>
+          <a:blip r:embed="rId2">
+            <a:extLst>
+              <a:ext uri="{28A0092B-C50C-407E-A947-70E740481C1C}">
+                <a14:useLocalDpi xmlns:a14="http://schemas.microsoft.com/office/drawing/2010/main" val="0"/>
+              </a:ext>
+            </a:extLst>
+          </a:blip>
+          <a:srcRect/>
+          <a:stretch>
+            <a:fillRect/>
+          </a:stretch>
+        </p:blipFill>
+        <p:spPr bwMode="auto">
+          <a:xfrm>
+            <a:off x="3528642" y="2459729"/>
+            <a:ext cx="4973714" cy="3604504"/>
+          </a:xfrm>
+          <a:prstGeom prst="rect">
+            <a:avLst/>
+          </a:prstGeom>
+          <a:noFill/>
+          <a:extLst>
+            <a:ext uri="{909E8E84-426E-40DD-AFC4-6F175D3DCCD1}">
+              <a14:hiddenFill xmlns:a14="http://schemas.microsoft.com/office/drawing/2010/main">
+                <a:solidFill>
+                  <a:srgbClr val="FFFFFF"/>
+                </a:solidFill>
+              </a14:hiddenFill>
+            </a:ext>
+          </a:extLst>
+        </p:spPr>
+      </p:pic>
+    </p:spTree>
+    <p:extLst>
+      <p:ext uri="{BB962C8B-B14F-4D97-AF65-F5344CB8AC3E}">
+        <p14:creationId xmlns:p14="http://schemas.microsoft.com/office/powerpoint/2010/main" val="2838860630"/>
+      </p:ext>
+    </p:extLst>
+  </p:cSld>
+  <p:clrMapOvr>
+    <a:masterClrMapping/>
+  </p:clrMapOvr>
+</p:sld>
+</file>
+
+<file path=ppt/slides/slide4.xml><?xml version="1.0" encoding="utf-8"?>
+<p:sld xmlns:a="http://schemas.openxmlformats.org/drawingml/2006/main" xmlns:r="http://schemas.openxmlformats.org/officeDocument/2006/relationships" xmlns:p="http://schemas.openxmlformats.org/presentationml/2006/main">
+  <p:cSld>
+    <p:spTree>
+      <p:nvGrpSpPr>
+        <p:cNvPr id="1" name=""/>
+        <p:cNvGrpSpPr/>
+        <p:nvPr/>
+      </p:nvGrpSpPr>
+      <p:grpSpPr>
+        <a:xfrm>
+          <a:off x="0" y="0"/>
+          <a:ext cx="0" cy="0"/>
+          <a:chOff x="0" y="0"/>
+          <a:chExt cx="0" cy="0"/>
+        </a:xfrm>
+      </p:grpSpPr>
+      <p:sp>
+        <p:nvSpPr>
+          <p:cNvPr id="4" name="Content Placeholder 2">
+            <a:extLst>
+              <a:ext uri="{FF2B5EF4-FFF2-40B4-BE49-F238E27FC236}">
+                <a16:creationId xmlns:a16="http://schemas.microsoft.com/office/drawing/2014/main" id="{6F33F3D2-3D39-79DA-D9E7-EABDD9054414}"/>
+              </a:ext>
+            </a:extLst>
+          </p:cNvPr>
+          <p:cNvSpPr txBox="1">
+            <a:spLocks/>
+          </p:cNvSpPr>
+          <p:nvPr/>
+        </p:nvSpPr>
+        <p:spPr>
+          <a:xfrm>
+            <a:off x="1900699" y="1914882"/>
+            <a:ext cx="8229600" cy="4853972"/>
+          </a:xfrm>
+          <a:prstGeom prst="rect">
+            <a:avLst/>
+          </a:prstGeom>
+        </p:spPr>
+        <p:txBody>
+          <a:bodyPr vert="horz" lIns="91440" tIns="45720" rIns="91440" bIns="45720" rtlCol="0">
+            <a:normAutofit/>
+          </a:bodyPr>
+          <a:lstStyle>
+            <a:lvl1pPr marL="228600" indent="-228600" algn="l" defTabSz="914400" rtl="0" eaLnBrk="1" latinLnBrk="0" hangingPunct="1">
+              <a:lnSpc>
+                <a:spcPct val="90000"/>
+              </a:lnSpc>
+              <a:spcBef>
+                <a:spcPts val="1000"/>
+              </a:spcBef>
+              <a:buFont typeface="Arial" panose="020B0604020202020204" pitchFamily="34" charset="0"/>
+              <a:buChar char="•"/>
+              <a:defRPr sz="2800" kern="1200">
+                <a:solidFill>
+                  <a:schemeClr val="tx1"/>
+                </a:solidFill>
+                <a:latin typeface="+mn-lt"/>
+                <a:ea typeface="+mn-ea"/>
+                <a:cs typeface="+mn-cs"/>
+              </a:defRPr>
+            </a:lvl1pPr>
+            <a:lvl2pPr marL="685800" indent="-228600" algn="l" defTabSz="914400" rtl="0" eaLnBrk="1" latinLnBrk="0" hangingPunct="1">
+              <a:lnSpc>
+                <a:spcPct val="90000"/>
+              </a:lnSpc>
+              <a:spcBef>
+                <a:spcPts val="500"/>
+              </a:spcBef>
+              <a:buFont typeface="Arial" panose="020B0604020202020204" pitchFamily="34" charset="0"/>
+              <a:buChar char="•"/>
+              <a:defRPr sz="2400" kern="1200">
+                <a:solidFill>
+                  <a:schemeClr val="tx1"/>
+                </a:solidFill>
+                <a:latin typeface="+mn-lt"/>
+                <a:ea typeface="+mn-ea"/>
+                <a:cs typeface="+mn-cs"/>
+              </a:defRPr>
+            </a:lvl2pPr>
+            <a:lvl3pPr marL="1143000" indent="-228600" algn="l" defTabSz="914400" rtl="0" eaLnBrk="1" latinLnBrk="0" hangingPunct="1">
+              <a:lnSpc>
+                <a:spcPct val="90000"/>
+              </a:lnSpc>
+              <a:spcBef>
+                <a:spcPts val="500"/>
+              </a:spcBef>
+              <a:buFont typeface="Arial" panose="020B0604020202020204" pitchFamily="34" charset="0"/>
+              <a:buChar char="•"/>
+              <a:defRPr sz="2000" kern="1200">
+                <a:solidFill>
+                  <a:schemeClr val="tx1"/>
+                </a:solidFill>
+                <a:latin typeface="+mn-lt"/>
+                <a:ea typeface="+mn-ea"/>
+                <a:cs typeface="+mn-cs"/>
+              </a:defRPr>
+            </a:lvl3pPr>
+            <a:lvl4pPr marL="1600200" indent="-228600" algn="l" defTabSz="914400" rtl="0" eaLnBrk="1" latinLnBrk="0" hangingPunct="1">
+              <a:lnSpc>
+                <a:spcPct val="90000"/>
+              </a:lnSpc>
+              <a:spcBef>
+                <a:spcPts val="500"/>
+              </a:spcBef>
+              <a:buFont typeface="Arial" panose="020B0604020202020204" pitchFamily="34" charset="0"/>
+              <a:buChar char="•"/>
+              <a:defRPr sz="1800" kern="1200">
+                <a:solidFill>
+                  <a:schemeClr val="tx1"/>
+                </a:solidFill>
+                <a:latin typeface="+mn-lt"/>
+                <a:ea typeface="+mn-ea"/>
+                <a:cs typeface="+mn-cs"/>
+              </a:defRPr>
+            </a:lvl4pPr>
+            <a:lvl5pPr marL="2057400" indent="-228600" algn="l" defTabSz="914400" rtl="0" eaLnBrk="1" latinLnBrk="0" hangingPunct="1">
+              <a:lnSpc>
+                <a:spcPct val="90000"/>
+              </a:lnSpc>
+              <a:spcBef>
+                <a:spcPts val="500"/>
+              </a:spcBef>
+              <a:buFont typeface="Arial" panose="020B0604020202020204" pitchFamily="34" charset="0"/>
+              <a:buChar char="•"/>
+              <a:defRPr sz="1800" kern="1200">
+                <a:solidFill>
+                  <a:schemeClr val="tx1"/>
+                </a:solidFill>
+                <a:latin typeface="+mn-lt"/>
+                <a:ea typeface="+mn-ea"/>
+                <a:cs typeface="+mn-cs"/>
+              </a:defRPr>
+            </a:lvl5pPr>
+            <a:lvl6pPr marL="2514600" indent="-228600" algn="l" defTabSz="914400" rtl="0" eaLnBrk="1" latinLnBrk="0" hangingPunct="1">
+              <a:lnSpc>
+                <a:spcPct val="90000"/>
+              </a:lnSpc>
+              <a:spcBef>
+                <a:spcPts val="500"/>
+              </a:spcBef>
+              <a:buFont typeface="Arial" panose="020B0604020202020204" pitchFamily="34" charset="0"/>
+              <a:buChar char="•"/>
+              <a:defRPr sz="1800" kern="1200">
+                <a:solidFill>
+                  <a:schemeClr val="tx1"/>
+                </a:solidFill>
+                <a:latin typeface="+mn-lt"/>
+                <a:ea typeface="+mn-ea"/>
+                <a:cs typeface="+mn-cs"/>
+              </a:defRPr>
+            </a:lvl6pPr>
+            <a:lvl7pPr marL="2971800" indent="-228600" algn="l" defTabSz="914400" rtl="0" eaLnBrk="1" latinLnBrk="0" hangingPunct="1">
+              <a:lnSpc>
+                <a:spcPct val="90000"/>
+              </a:lnSpc>
+              <a:spcBef>
+                <a:spcPts val="500"/>
+              </a:spcBef>
+              <a:buFont typeface="Arial" panose="020B0604020202020204" pitchFamily="34" charset="0"/>
+              <a:buChar char="•"/>
+              <a:defRPr sz="1800" kern="1200">
+                <a:solidFill>
+                  <a:schemeClr val="tx1"/>
+                </a:solidFill>
+                <a:latin typeface="+mn-lt"/>
+                <a:ea typeface="+mn-ea"/>
+                <a:cs typeface="+mn-cs"/>
+              </a:defRPr>
+            </a:lvl7pPr>
+            <a:lvl8pPr marL="3429000" indent="-228600" algn="l" defTabSz="914400" rtl="0" eaLnBrk="1" latinLnBrk="0" hangingPunct="1">
+              <a:lnSpc>
+                <a:spcPct val="90000"/>
+              </a:lnSpc>
+              <a:spcBef>
+                <a:spcPts val="500"/>
+              </a:spcBef>
+              <a:buFont typeface="Arial" panose="020B0604020202020204" pitchFamily="34" charset="0"/>
+              <a:buChar char="•"/>
+              <a:defRPr sz="1800" kern="1200">
+                <a:solidFill>
+                  <a:schemeClr val="tx1"/>
+                </a:solidFill>
+                <a:latin typeface="+mn-lt"/>
+                <a:ea typeface="+mn-ea"/>
+                <a:cs typeface="+mn-cs"/>
+              </a:defRPr>
+            </a:lvl8pPr>
+            <a:lvl9pPr marL="3886200" indent="-228600" algn="l" defTabSz="914400" rtl="0" eaLnBrk="1" latinLnBrk="0" hangingPunct="1">
+              <a:lnSpc>
+                <a:spcPct val="90000"/>
+              </a:lnSpc>
+              <a:spcBef>
+                <a:spcPts val="500"/>
+              </a:spcBef>
+              <a:buFont typeface="Arial" panose="020B0604020202020204" pitchFamily="34" charset="0"/>
+              <a:buChar char="•"/>
+              <a:defRPr sz="1800" kern="1200">
+                <a:solidFill>
+                  <a:schemeClr val="tx1"/>
+                </a:solidFill>
+                <a:latin typeface="+mn-lt"/>
+                <a:ea typeface="+mn-ea"/>
+                <a:cs typeface="+mn-cs"/>
+              </a:defRPr>
+            </a:lvl9pPr>
+          </a:lstStyle>
+          <a:p>
+            <a:pPr marL="0" indent="0">
+              <a:buFont typeface="Arial" panose="020B0604020202020204" pitchFamily="34" charset="0"/>
+              <a:buNone/>
+            </a:pPr>
+            <a:r>
+              <a:rPr lang="en-US" b="1" dirty="0"/>
+              <a:t>Expressiveness</a:t>
+            </a:r>
+            <a:r>
+              <a:rPr lang="en-US" dirty="0"/>
+              <a:t>: how much information can we convey</a:t>
+            </a:r>
+          </a:p>
+          <a:p>
+            <a:pPr marL="0" indent="0">
+              <a:buFont typeface="Arial" panose="020B0604020202020204" pitchFamily="34" charset="0"/>
+              <a:buNone/>
+            </a:pPr>
+            <a:endParaRPr lang="en-US" dirty="0"/>
+          </a:p>
+          <a:p>
+            <a:pPr marL="0" indent="0">
+              <a:buFont typeface="Arial" panose="020B0604020202020204" pitchFamily="34" charset="0"/>
+              <a:buNone/>
+            </a:pPr>
+            <a:endParaRPr lang="en-US" dirty="0"/>
+          </a:p>
+          <a:p>
+            <a:pPr marL="0" indent="0">
+              <a:buFont typeface="Arial" panose="020B0604020202020204" pitchFamily="34" charset="0"/>
+              <a:buNone/>
+            </a:pPr>
+            <a:endParaRPr lang="en-US" dirty="0"/>
+          </a:p>
+          <a:p>
+            <a:pPr marL="0" indent="0">
+              <a:buFont typeface="Arial" panose="020B0604020202020204" pitchFamily="34" charset="0"/>
+              <a:buNone/>
+            </a:pPr>
+            <a:r>
+              <a:rPr lang="en-US" b="1" dirty="0"/>
+              <a:t>Effectiveness:</a:t>
+            </a:r>
+            <a:r>
+              <a:rPr lang="en-US" dirty="0"/>
+              <a:t> how easy is the information to digest </a:t>
+            </a:r>
+          </a:p>
+          <a:p>
+            <a:endParaRPr lang="en-US" dirty="0"/>
+          </a:p>
+          <a:p>
+            <a:pPr marL="342900" indent="-342900"/>
+            <a:endParaRPr lang="en-US" dirty="0"/>
+          </a:p>
+        </p:txBody>
+      </p:sp>
+      <p:pic>
+        <p:nvPicPr>
+          <p:cNvPr id="6" name="Graphic 5" descr="Right And Left Brain with solid fill">
+            <a:extLst>
+              <a:ext uri="{FF2B5EF4-FFF2-40B4-BE49-F238E27FC236}">
+                <a16:creationId xmlns:a16="http://schemas.microsoft.com/office/drawing/2014/main" id="{9FAA29AA-EDCD-1D8D-4688-9F6FDD060D2F}"/>
+              </a:ext>
+            </a:extLst>
+          </p:cNvPr>
+          <p:cNvPicPr>
+            <a:picLocks noChangeAspect="1"/>
+          </p:cNvPicPr>
+          <p:nvPr/>
+        </p:nvPicPr>
+        <p:blipFill>
+          <a:blip r:embed="rId2">
+            <a:extLst>
+              <a:ext uri="{96DAC541-7B7A-43D3-8B79-37D633B846F1}">
+                <asvg:svgBlip xmlns:asvg="http://schemas.microsoft.com/office/drawing/2016/SVG/main" r:embed="rId3"/>
+              </a:ext>
+            </a:extLst>
+          </a:blip>
+          <a:stretch>
+            <a:fillRect/>
+          </a:stretch>
+        </p:blipFill>
+        <p:spPr>
+          <a:xfrm>
+            <a:off x="4863103" y="4333880"/>
+            <a:ext cx="2051263" cy="2051263"/>
+          </a:xfrm>
+          <a:prstGeom prst="rect">
+            <a:avLst/>
+          </a:prstGeom>
+        </p:spPr>
+      </p:pic>
+      <p:pic>
+        <p:nvPicPr>
+          <p:cNvPr id="8" name="Graphic 7" descr="Information with solid fill">
+            <a:extLst>
+              <a:ext uri="{FF2B5EF4-FFF2-40B4-BE49-F238E27FC236}">
+                <a16:creationId xmlns:a16="http://schemas.microsoft.com/office/drawing/2014/main" id="{F60AA4EA-8DF6-AC51-7908-73E807C82311}"/>
+              </a:ext>
+            </a:extLst>
+          </p:cNvPr>
+          <p:cNvPicPr>
+            <a:picLocks noChangeAspect="1"/>
+          </p:cNvPicPr>
+          <p:nvPr/>
+        </p:nvPicPr>
+        <p:blipFill>
+          <a:blip r:embed="rId4">
+            <a:extLst>
+              <a:ext uri="{96DAC541-7B7A-43D3-8B79-37D633B846F1}">
+                <asvg:svgBlip xmlns:asvg="http://schemas.microsoft.com/office/drawing/2016/SVG/main" r:embed="rId5"/>
+              </a:ext>
+            </a:extLst>
+          </a:blip>
+          <a:stretch>
+            <a:fillRect/>
+          </a:stretch>
+        </p:blipFill>
+        <p:spPr>
+          <a:xfrm>
+            <a:off x="5087655" y="2273769"/>
+            <a:ext cx="1676400" cy="1676400"/>
+          </a:xfrm>
+          <a:prstGeom prst="rect">
+            <a:avLst/>
+          </a:prstGeom>
+        </p:spPr>
+      </p:pic>
+    </p:spTree>
+    <p:extLst>
+      <p:ext uri="{BB962C8B-B14F-4D97-AF65-F5344CB8AC3E}">
+        <p14:creationId xmlns:p14="http://schemas.microsoft.com/office/powerpoint/2010/main" val="646212148"/>
+      </p:ext>
+    </p:extLst>
+  </p:cSld>
+  <p:clrMapOvr>
+    <a:masterClrMapping/>
+  </p:clrMapOvr>
+</p:sld>
+</file>
+
+<file path=ppt/slides/slide5.xml><?xml version="1.0" encoding="utf-8"?>
+<p:sld xmlns:a="http://schemas.openxmlformats.org/drawingml/2006/main" xmlns:r="http://schemas.openxmlformats.org/officeDocument/2006/relationships" xmlns:p="http://schemas.openxmlformats.org/presentationml/2006/main">
+  <p:cSld>
+    <p:spTree>
+      <p:nvGrpSpPr>
+        <p:cNvPr id="1" name=""/>
+        <p:cNvGrpSpPr/>
+        <p:nvPr/>
+      </p:nvGrpSpPr>
+      <p:grpSpPr>
+        <a:xfrm>
+          <a:off x="0" y="0"/>
+          <a:ext cx="0" cy="0"/>
+          <a:chOff x="0" y="0"/>
+          <a:chExt cx="0" cy="0"/>
+        </a:xfrm>
+      </p:grpSpPr>
+      <p:pic>
+        <p:nvPicPr>
+          <p:cNvPr id="4100" name="Picture 4">
+            <a:extLst>
+              <a:ext uri="{FF2B5EF4-FFF2-40B4-BE49-F238E27FC236}">
+                <a16:creationId xmlns:a16="http://schemas.microsoft.com/office/drawing/2014/main" id="{04B64418-B387-29CF-F2C9-923F0734B034}"/>
+              </a:ext>
+            </a:extLst>
+          </p:cNvPr>
+          <p:cNvPicPr>
+            <a:picLocks noChangeAspect="1" noChangeArrowheads="1"/>
+          </p:cNvPicPr>
+          <p:nvPr/>
+        </p:nvPicPr>
+        <p:blipFill>
+          <a:blip r:embed="rId2">
+            <a:extLst>
+              <a:ext uri="{28A0092B-C50C-407E-A947-70E740481C1C}">
+                <a14:useLocalDpi xmlns:a14="http://schemas.microsoft.com/office/drawing/2010/main" val="0"/>
+              </a:ext>
+            </a:extLst>
+          </a:blip>
+          <a:srcRect/>
+          <a:stretch>
+            <a:fillRect/>
+          </a:stretch>
+        </p:blipFill>
+        <p:spPr bwMode="auto">
+          <a:xfrm>
+            <a:off x="1416746" y="1039659"/>
+            <a:ext cx="9173437" cy="5674291"/>
+          </a:xfrm>
+          <a:prstGeom prst="rect">
+            <a:avLst/>
+          </a:prstGeom>
+          <a:noFill/>
+          <a:extLst>
+            <a:ext uri="{909E8E84-426E-40DD-AFC4-6F175D3DCCD1}">
+              <a14:hiddenFill xmlns:a14="http://schemas.microsoft.com/office/drawing/2010/main">
+                <a:solidFill>
+                  <a:srgbClr val="FFFFFF"/>
+                </a:solidFill>
+              </a14:hiddenFill>
+            </a:ext>
+          </a:extLst>
+        </p:spPr>
+      </p:pic>
+    </p:spTree>
+    <p:extLst>
+      <p:ext uri="{BB962C8B-B14F-4D97-AF65-F5344CB8AC3E}">
+        <p14:creationId xmlns:p14="http://schemas.microsoft.com/office/powerpoint/2010/main" val="4102826409"/>
+      </p:ext>
+    </p:extLst>
+  </p:cSld>
+  <p:clrMapOvr>
+    <a:masterClrMapping/>
+  </p:clrMapOvr>
+</p:sld>
+</file>
+
+<file path=ppt/slides/slide6.xml><?xml version="1.0" encoding="utf-8"?>
+<p:sld xmlns:a="http://schemas.openxmlformats.org/drawingml/2006/main" xmlns:r="http://schemas.openxmlformats.org/officeDocument/2006/relationships" xmlns:p="http://schemas.openxmlformats.org/presentationml/2006/main">
+  <p:cSld>
+    <p:spTree>
+      <p:nvGrpSpPr>
+        <p:cNvPr id="1" name=""/>
+        <p:cNvGrpSpPr/>
+        <p:nvPr/>
+      </p:nvGrpSpPr>
+      <p:grpSpPr>
+        <a:xfrm>
+          <a:off x="0" y="0"/>
+          <a:ext cx="0" cy="0"/>
+          <a:chOff x="0" y="0"/>
+          <a:chExt cx="0" cy="0"/>
+        </a:xfrm>
+      </p:grpSpPr>
+      <p:pic>
+        <p:nvPicPr>
+          <p:cNvPr id="5122" name="Picture 2" descr="Harvard CS171 | Unlimited Code Works">
+            <a:extLst>
+              <a:ext uri="{FF2B5EF4-FFF2-40B4-BE49-F238E27FC236}">
+                <a16:creationId xmlns:a16="http://schemas.microsoft.com/office/drawing/2014/main" id="{F9A97A6B-7250-12BB-E926-ABAE655B119D}"/>
+              </a:ext>
+            </a:extLst>
+          </p:cNvPr>
+          <p:cNvPicPr>
+            <a:picLocks noChangeAspect="1" noChangeArrowheads="1"/>
+          </p:cNvPicPr>
+          <p:nvPr/>
+        </p:nvPicPr>
+        <p:blipFill>
+          <a:blip r:embed="rId2">
+            <a:extLst>
+              <a:ext uri="{28A0092B-C50C-407E-A947-70E740481C1C}">
+                <a14:useLocalDpi xmlns:a14="http://schemas.microsoft.com/office/drawing/2010/main" val="0"/>
+              </a:ext>
+            </a:extLst>
+          </a:blip>
+          <a:srcRect/>
+          <a:stretch>
+            <a:fillRect/>
+          </a:stretch>
+        </p:blipFill>
+        <p:spPr bwMode="auto">
+          <a:xfrm>
+            <a:off x="3739020" y="1690688"/>
+            <a:ext cx="4999886" cy="3754477"/>
+          </a:xfrm>
+          <a:prstGeom prst="rect">
+            <a:avLst/>
+          </a:prstGeom>
+          <a:noFill/>
+          <a:extLst>
+            <a:ext uri="{909E8E84-426E-40DD-AFC4-6F175D3DCCD1}">
+              <a14:hiddenFill xmlns:a14="http://schemas.microsoft.com/office/drawing/2010/main">
+                <a:solidFill>
+                  <a:srgbClr val="FFFFFF"/>
+                </a:solidFill>
+              </a14:hiddenFill>
+            </a:ext>
+          </a:extLst>
+        </p:spPr>
+      </p:pic>
+    </p:spTree>
+    <p:extLst>
+      <p:ext uri="{BB962C8B-B14F-4D97-AF65-F5344CB8AC3E}">
+        <p14:creationId xmlns:p14="http://schemas.microsoft.com/office/powerpoint/2010/main" val="331381331"/>
+      </p:ext>
+    </p:extLst>
+  </p:cSld>
+  <p:clrMapOvr>
+    <a:masterClrMapping/>
+  </p:clrMapOvr>
+</p:sld>
+</file>
+
+<file path=ppt/slides/slide7.xml><?xml version="1.0" encoding="utf-8"?>
+<p:sld xmlns:a="http://schemas.openxmlformats.org/drawingml/2006/main" xmlns:r="http://schemas.openxmlformats.org/officeDocument/2006/relationships" xmlns:p="http://schemas.openxmlformats.org/presentationml/2006/main">
+  <p:cSld>
+    <p:spTree>
+      <p:nvGrpSpPr>
+        <p:cNvPr id="1" name=""/>
+        <p:cNvGrpSpPr/>
+        <p:nvPr/>
+      </p:nvGrpSpPr>
+      <p:grpSpPr>
+        <a:xfrm>
+          <a:off x="0" y="0"/>
+          <a:ext cx="0" cy="0"/>
+          <a:chOff x="0" y="0"/>
+          <a:chExt cx="0" cy="0"/>
+        </a:xfrm>
+      </p:grpSpPr>
+      <p:pic>
+        <p:nvPicPr>
+          <p:cNvPr id="4" name="Picture 3">
+            <a:extLst>
+              <a:ext uri="{FF2B5EF4-FFF2-40B4-BE49-F238E27FC236}">
+                <a16:creationId xmlns:a16="http://schemas.microsoft.com/office/drawing/2014/main" id="{37DD4A69-88D7-4BDB-F69C-D9E2B3FA9702}"/>
+              </a:ext>
+            </a:extLst>
+          </p:cNvPr>
+          <p:cNvPicPr>
+            <a:picLocks noChangeAspect="1"/>
+          </p:cNvPicPr>
+          <p:nvPr/>
+        </p:nvPicPr>
+        <p:blipFill>
+          <a:blip r:embed="rId2"/>
+          <a:stretch>
+            <a:fillRect/>
+          </a:stretch>
+        </p:blipFill>
+        <p:spPr>
+          <a:xfrm>
+            <a:off x="4029954" y="1555055"/>
+            <a:ext cx="3579607" cy="4025290"/>
+          </a:xfrm>
+          <a:prstGeom prst="rect">
+            <a:avLst/>
+          </a:prstGeom>
+        </p:spPr>
+      </p:pic>
+    </p:spTree>
+    <p:extLst>
+      <p:ext uri="{BB962C8B-B14F-4D97-AF65-F5344CB8AC3E}">
+        <p14:creationId xmlns:p14="http://schemas.microsoft.com/office/powerpoint/2010/main" val="358271565"/>
       </p:ext>
     </p:extLst>
   </p:cSld>

</xml_diff>